<commit_message>
Add comments and edit documentation
</commit_message>
<xml_diff>
--- a/Documents/Presentation.pptx
+++ b/Documents/Presentation.pptx
@@ -1063,98 +1063,6 @@
         </a:p>
       </dgm:t>
     </dgm:pt>
-    <dgm:pt modelId="{5A55F53A-1FA0-44F0-A471-6DE2B3FF40DA}">
-      <dgm:prSet phldrT="[Text]" phldr="1"/>
-      <dgm:spPr>
-        <a:solidFill>
-          <a:srgbClr val="EFE3E1">
-            <a:alpha val="89804"/>
-          </a:srgbClr>
-        </a:solidFill>
-        <a:ln>
-          <a:noFill/>
-        </a:ln>
-      </dgm:spPr>
-      <dgm:t>
-        <a:bodyPr/>
-        <a:lstStyle/>
-        <a:p>
-          <a:endParaRPr lang="en-US" dirty="0">
-            <a:solidFill>
-              <a:srgbClr val="972A3A"/>
-            </a:solidFill>
-          </a:endParaRPr>
-        </a:p>
-      </dgm:t>
-    </dgm:pt>
-    <dgm:pt modelId="{D7E4A8CC-582A-41D2-A92D-B79CC64D9F08}" type="parTrans" cxnId="{C2E2F6FD-72DF-48C0-A462-E6688B9CBD1C}">
-      <dgm:prSet/>
-      <dgm:spPr/>
-      <dgm:t>
-        <a:bodyPr/>
-        <a:lstStyle/>
-        <a:p>
-          <a:endParaRPr lang="en-US"/>
-        </a:p>
-      </dgm:t>
-    </dgm:pt>
-    <dgm:pt modelId="{AB93B531-5066-4B8C-A289-577840BBA839}" type="sibTrans" cxnId="{C2E2F6FD-72DF-48C0-A462-E6688B9CBD1C}">
-      <dgm:prSet/>
-      <dgm:spPr/>
-      <dgm:t>
-        <a:bodyPr/>
-        <a:lstStyle/>
-        <a:p>
-          <a:endParaRPr lang="en-US"/>
-        </a:p>
-      </dgm:t>
-    </dgm:pt>
-    <dgm:pt modelId="{D4AE0BEF-8D8D-4274-ACD8-9357F25363F9}">
-      <dgm:prSet phldrT="[Text]" phldr="1"/>
-      <dgm:spPr>
-        <a:solidFill>
-          <a:srgbClr val="EFE3E1">
-            <a:alpha val="89804"/>
-          </a:srgbClr>
-        </a:solidFill>
-        <a:ln>
-          <a:noFill/>
-        </a:ln>
-      </dgm:spPr>
-      <dgm:t>
-        <a:bodyPr/>
-        <a:lstStyle/>
-        <a:p>
-          <a:endParaRPr lang="en-US" dirty="0">
-            <a:solidFill>
-              <a:srgbClr val="972A3A"/>
-            </a:solidFill>
-          </a:endParaRPr>
-        </a:p>
-      </dgm:t>
-    </dgm:pt>
-    <dgm:pt modelId="{FD623DF5-C4A5-41FC-91A1-2A6881EEBF94}" type="parTrans" cxnId="{611E1B3C-0982-4DB1-9137-5A9FD5A38013}">
-      <dgm:prSet/>
-      <dgm:spPr/>
-      <dgm:t>
-        <a:bodyPr/>
-        <a:lstStyle/>
-        <a:p>
-          <a:endParaRPr lang="en-US"/>
-        </a:p>
-      </dgm:t>
-    </dgm:pt>
-    <dgm:pt modelId="{EFECFB5E-A726-4D9E-8A16-E39EC7FFC445}" type="sibTrans" cxnId="{611E1B3C-0982-4DB1-9137-5A9FD5A38013}">
-      <dgm:prSet/>
-      <dgm:spPr/>
-      <dgm:t>
-        <a:bodyPr/>
-        <a:lstStyle/>
-        <a:p>
-          <a:endParaRPr lang="en-US"/>
-        </a:p>
-      </dgm:t>
-    </dgm:pt>
     <dgm:pt modelId="{2ECA8FF7-8452-4993-BE95-C5BF94416935}">
       <dgm:prSet phldrT="[Text]" custT="1"/>
       <dgm:spPr>
@@ -1206,98 +1114,6 @@
           <a:srgbClr val="595959"/>
         </a:solidFill>
       </dgm:spPr>
-      <dgm:t>
-        <a:bodyPr/>
-        <a:lstStyle/>
-        <a:p>
-          <a:endParaRPr lang="en-US"/>
-        </a:p>
-      </dgm:t>
-    </dgm:pt>
-    <dgm:pt modelId="{0A2CF205-6D73-43A4-BB70-BD446720586C}">
-      <dgm:prSet phldrT="[Text]" phldr="1"/>
-      <dgm:spPr>
-        <a:solidFill>
-          <a:srgbClr val="EFE3E1">
-            <a:alpha val="90000"/>
-          </a:srgbClr>
-        </a:solidFill>
-        <a:ln>
-          <a:noFill/>
-        </a:ln>
-      </dgm:spPr>
-      <dgm:t>
-        <a:bodyPr/>
-        <a:lstStyle/>
-        <a:p>
-          <a:endParaRPr lang="en-US" dirty="0">
-            <a:solidFill>
-              <a:srgbClr val="972A3A"/>
-            </a:solidFill>
-          </a:endParaRPr>
-        </a:p>
-      </dgm:t>
-    </dgm:pt>
-    <dgm:pt modelId="{6FA1680D-EB15-4A2D-A515-8848892C3FA6}" type="parTrans" cxnId="{DB1AB310-D9A2-4B9E-B5BE-9A95C99CDCFA}">
-      <dgm:prSet/>
-      <dgm:spPr/>
-      <dgm:t>
-        <a:bodyPr/>
-        <a:lstStyle/>
-        <a:p>
-          <a:endParaRPr lang="en-US"/>
-        </a:p>
-      </dgm:t>
-    </dgm:pt>
-    <dgm:pt modelId="{FB983D3D-5C2E-4782-B54F-95C098506F01}" type="sibTrans" cxnId="{DB1AB310-D9A2-4B9E-B5BE-9A95C99CDCFA}">
-      <dgm:prSet/>
-      <dgm:spPr/>
-      <dgm:t>
-        <a:bodyPr/>
-        <a:lstStyle/>
-        <a:p>
-          <a:endParaRPr lang="en-US"/>
-        </a:p>
-      </dgm:t>
-    </dgm:pt>
-    <dgm:pt modelId="{B39E2D75-7925-4E9B-AE76-DF7335447629}">
-      <dgm:prSet phldrT="[Text]" phldr="1"/>
-      <dgm:spPr>
-        <a:solidFill>
-          <a:srgbClr val="EFE3E1">
-            <a:alpha val="90000"/>
-          </a:srgbClr>
-        </a:solidFill>
-        <a:ln>
-          <a:noFill/>
-        </a:ln>
-      </dgm:spPr>
-      <dgm:t>
-        <a:bodyPr/>
-        <a:lstStyle/>
-        <a:p>
-          <a:endParaRPr lang="en-US" dirty="0">
-            <a:solidFill>
-              <a:srgbClr val="972A3A"/>
-            </a:solidFill>
-          </a:endParaRPr>
-        </a:p>
-      </dgm:t>
-    </dgm:pt>
-    <dgm:pt modelId="{03003D3C-7894-4EF0-BFAF-4FA6AEE88885}" type="parTrans" cxnId="{9C5F735B-0BA7-429E-B937-C05DCFCCE137}">
-      <dgm:prSet/>
-      <dgm:spPr/>
-      <dgm:t>
-        <a:bodyPr/>
-        <a:lstStyle/>
-        <a:p>
-          <a:endParaRPr lang="en-US"/>
-        </a:p>
-      </dgm:t>
-    </dgm:pt>
-    <dgm:pt modelId="{89389DB7-8348-4A4A-A8FD-B48B9FD02663}" type="sibTrans" cxnId="{9C5F735B-0BA7-429E-B937-C05DCFCCE137}">
-      <dgm:prSet/>
-      <dgm:spPr/>
       <dgm:t>
         <a:bodyPr/>
         <a:lstStyle/>
@@ -1361,98 +1177,6 @@
         </a:p>
       </dgm:t>
     </dgm:pt>
-    <dgm:pt modelId="{1D45AC10-2207-4580-9C20-5190C50E6952}">
-      <dgm:prSet phldrT="[Text]" phldr="1"/>
-      <dgm:spPr>
-        <a:solidFill>
-          <a:srgbClr val="EFE3E1">
-            <a:alpha val="90000"/>
-          </a:srgbClr>
-        </a:solidFill>
-        <a:ln>
-          <a:noFill/>
-        </a:ln>
-      </dgm:spPr>
-      <dgm:t>
-        <a:bodyPr/>
-        <a:lstStyle/>
-        <a:p>
-          <a:endParaRPr lang="en-US" dirty="0">
-            <a:solidFill>
-              <a:srgbClr val="972A3A"/>
-            </a:solidFill>
-          </a:endParaRPr>
-        </a:p>
-      </dgm:t>
-    </dgm:pt>
-    <dgm:pt modelId="{116EE3DA-AB78-49ED-8FF3-BA46E73DCE4E}" type="parTrans" cxnId="{0BEEC3A4-97FA-4A0D-8C99-525100BFF2DD}">
-      <dgm:prSet/>
-      <dgm:spPr/>
-      <dgm:t>
-        <a:bodyPr/>
-        <a:lstStyle/>
-        <a:p>
-          <a:endParaRPr lang="en-US"/>
-        </a:p>
-      </dgm:t>
-    </dgm:pt>
-    <dgm:pt modelId="{B1ACBACC-6D14-4419-BE02-B4E21E934C1E}" type="sibTrans" cxnId="{0BEEC3A4-97FA-4A0D-8C99-525100BFF2DD}">
-      <dgm:prSet/>
-      <dgm:spPr/>
-      <dgm:t>
-        <a:bodyPr/>
-        <a:lstStyle/>
-        <a:p>
-          <a:endParaRPr lang="en-US"/>
-        </a:p>
-      </dgm:t>
-    </dgm:pt>
-    <dgm:pt modelId="{2067B8ED-E470-4308-86F3-B1B1E2F00CC5}">
-      <dgm:prSet phldrT="[Text]" phldr="1"/>
-      <dgm:spPr>
-        <a:solidFill>
-          <a:srgbClr val="EFE3E1">
-            <a:alpha val="90000"/>
-          </a:srgbClr>
-        </a:solidFill>
-        <a:ln>
-          <a:noFill/>
-        </a:ln>
-      </dgm:spPr>
-      <dgm:t>
-        <a:bodyPr/>
-        <a:lstStyle/>
-        <a:p>
-          <a:endParaRPr lang="en-US" dirty="0">
-            <a:solidFill>
-              <a:srgbClr val="972A3A"/>
-            </a:solidFill>
-          </a:endParaRPr>
-        </a:p>
-      </dgm:t>
-    </dgm:pt>
-    <dgm:pt modelId="{6FF42023-FEF6-40C1-BD69-AC52ED36F8C5}" type="parTrans" cxnId="{3CA91AC6-BD92-4983-805D-F65B3F68CA3C}">
-      <dgm:prSet/>
-      <dgm:spPr/>
-      <dgm:t>
-        <a:bodyPr/>
-        <a:lstStyle/>
-        <a:p>
-          <a:endParaRPr lang="en-US"/>
-        </a:p>
-      </dgm:t>
-    </dgm:pt>
-    <dgm:pt modelId="{A7EFC671-1A31-47D4-A23F-63A07D62746E}" type="sibTrans" cxnId="{3CA91AC6-BD92-4983-805D-F65B3F68CA3C}">
-      <dgm:prSet/>
-      <dgm:spPr/>
-      <dgm:t>
-        <a:bodyPr/>
-        <a:lstStyle/>
-        <a:p>
-          <a:endParaRPr lang="en-US"/>
-        </a:p>
-      </dgm:t>
-    </dgm:pt>
     <dgm:pt modelId="{565F9BFE-BDB9-432B-98E6-89E646918D46}" type="pres">
       <dgm:prSet presAssocID="{D9BD354B-FC53-4B66-938E-867353189C31}" presName="Name0" presStyleCnt="0">
         <dgm:presLayoutVars>
@@ -1484,7 +1208,7 @@
       <dgm:spPr/>
     </dgm:pt>
     <dgm:pt modelId="{06C436DA-0F0F-47EC-9A59-1748912EAE90}" type="pres">
-      <dgm:prSet presAssocID="{00998F9B-8E30-403B-9364-BEF5F913E0BA}" presName="childNode1" presStyleLbl="bgAcc1" presStyleIdx="0" presStyleCnt="3" custAng="0">
+      <dgm:prSet presAssocID="{00998F9B-8E30-403B-9364-BEF5F913E0BA}" presName="childNode1" presStyleLbl="bgAcc1" presStyleIdx="0" presStyleCnt="3" custAng="0" custFlipHor="1" custScaleX="72750" custScaleY="40582" custLinFactNeighborX="-7706" custLinFactNeighborY="20091">
         <dgm:presLayoutVars>
           <dgm:bulletEnabled val="1"/>
         </dgm:presLayoutVars>
@@ -1525,7 +1249,7 @@
       <dgm:spPr/>
     </dgm:pt>
     <dgm:pt modelId="{5FF5F08C-1ED8-4A78-BE4D-5B990CB2B319}" type="pres">
-      <dgm:prSet presAssocID="{2ECA8FF7-8452-4993-BE95-C5BF94416935}" presName="childNode2" presStyleLbl="bgAcc1" presStyleIdx="1" presStyleCnt="3">
+      <dgm:prSet presAssocID="{2ECA8FF7-8452-4993-BE95-C5BF94416935}" presName="childNode2" presStyleLbl="bgAcc1" presStyleIdx="1" presStyleCnt="3" custFlipVert="1" custScaleX="76687" custScaleY="36875" custLinFactNeighborX="-600" custLinFactNeighborY="-24693">
         <dgm:presLayoutVars>
           <dgm:bulletEnabled val="1"/>
         </dgm:presLayoutVars>
@@ -1566,7 +1290,7 @@
       <dgm:spPr/>
     </dgm:pt>
     <dgm:pt modelId="{8374D416-8259-404A-A853-FE5C4D036E80}" type="pres">
-      <dgm:prSet presAssocID="{C3D21EA0-5807-4CC5-A3AE-69B93C472168}" presName="childNode1" presStyleLbl="bgAcc1" presStyleIdx="2" presStyleCnt="3">
+      <dgm:prSet presAssocID="{C3D21EA0-5807-4CC5-A3AE-69B93C472168}" presName="childNode1" presStyleLbl="bgAcc1" presStyleIdx="2" presStyleCnt="3" custScaleX="79076" custScaleY="46858" custLinFactNeighborX="-5117" custLinFactNeighborY="19918">
         <dgm:presLayoutVars>
           <dgm:bulletEnabled val="1"/>
         </dgm:presLayoutVars>
@@ -1596,33 +1320,15 @@
     </dgm:pt>
   </dgm:ptLst>
   <dgm:cxnLst>
-    <dgm:cxn modelId="{1AD61601-1738-4567-8967-25F1024BF453}" type="presOf" srcId="{B39E2D75-7925-4E9B-AE76-DF7335447629}" destId="{5FF5F08C-1ED8-4A78-BE4D-5B990CB2B319}" srcOrd="0" destOrd="1" presId="urn:microsoft.com/office/officeart/2005/8/layout/hProcess4"/>
-    <dgm:cxn modelId="{E8E7F70B-5129-4D70-8AD1-75573EA3E3C4}" type="presOf" srcId="{0A2CF205-6D73-43A4-BB70-BD446720586C}" destId="{5FF5F08C-1ED8-4A78-BE4D-5B990CB2B319}" srcOrd="0" destOrd="0" presId="urn:microsoft.com/office/officeart/2005/8/layout/hProcess4"/>
-    <dgm:cxn modelId="{D517F00C-2BDB-4BB2-9485-0911D2B91E2A}" type="presOf" srcId="{5A55F53A-1FA0-44F0-A471-6DE2B3FF40DA}" destId="{32D10677-46E0-4588-B7E3-AB885E7226F9}" srcOrd="1" destOrd="0" presId="urn:microsoft.com/office/officeart/2005/8/layout/hProcess4"/>
-    <dgm:cxn modelId="{DB1AB310-D9A2-4B9E-B5BE-9A95C99CDCFA}" srcId="{2ECA8FF7-8452-4993-BE95-C5BF94416935}" destId="{0A2CF205-6D73-43A4-BB70-BD446720586C}" srcOrd="0" destOrd="0" parTransId="{6FA1680D-EB15-4A2D-A515-8848892C3FA6}" sibTransId="{FB983D3D-5C2E-4782-B54F-95C098506F01}"/>
     <dgm:cxn modelId="{7BD4CB18-B625-49AE-BF3A-6865A90E4386}" type="presOf" srcId="{2ECA8FF7-8452-4993-BE95-C5BF94416935}" destId="{260FC800-3B97-4686-86F1-CA2BE36BB76F}" srcOrd="0" destOrd="0" presId="urn:microsoft.com/office/officeart/2005/8/layout/hProcess4"/>
-    <dgm:cxn modelId="{50A0A421-DC11-4459-8C31-ED842BCF2B33}" type="presOf" srcId="{1D45AC10-2207-4580-9C20-5190C50E6952}" destId="{8374D416-8259-404A-A853-FE5C4D036E80}" srcOrd="0" destOrd="0" presId="urn:microsoft.com/office/officeart/2005/8/layout/hProcess4"/>
-    <dgm:cxn modelId="{BA21CA22-44E2-4FC8-AAE9-3D3B323F45A0}" type="presOf" srcId="{5A55F53A-1FA0-44F0-A471-6DE2B3FF40DA}" destId="{06C436DA-0F0F-47EC-9A59-1748912EAE90}" srcOrd="0" destOrd="0" presId="urn:microsoft.com/office/officeart/2005/8/layout/hProcess4"/>
-    <dgm:cxn modelId="{0C1B2234-C7AD-45AA-B96E-37195A23EE4D}" type="presOf" srcId="{2067B8ED-E470-4308-86F3-B1B1E2F00CC5}" destId="{FD569E05-4884-4284-9D47-18C9761413A9}" srcOrd="1" destOrd="1" presId="urn:microsoft.com/office/officeart/2005/8/layout/hProcess4"/>
-    <dgm:cxn modelId="{611E1B3C-0982-4DB1-9137-5A9FD5A38013}" srcId="{00998F9B-8E30-403B-9364-BEF5F913E0BA}" destId="{D4AE0BEF-8D8D-4274-ACD8-9357F25363F9}" srcOrd="1" destOrd="0" parTransId="{FD623DF5-C4A5-41FC-91A1-2A6881EEBF94}" sibTransId="{EFECFB5E-A726-4D9E-8A16-E39EC7FFC445}"/>
-    <dgm:cxn modelId="{9C5F735B-0BA7-429E-B937-C05DCFCCE137}" srcId="{2ECA8FF7-8452-4993-BE95-C5BF94416935}" destId="{B39E2D75-7925-4E9B-AE76-DF7335447629}" srcOrd="1" destOrd="0" parTransId="{03003D3C-7894-4EF0-BFAF-4FA6AEE88885}" sibTransId="{89389DB7-8348-4A4A-A8FD-B48B9FD02663}"/>
     <dgm:cxn modelId="{3654D145-A23B-4B02-9834-0B896EBDDEE7}" type="presOf" srcId="{A5F1C0E4-4FCB-46A8-B9EF-07C5C3EF6B17}" destId="{CC69C9B7-E8B5-468B-8A4F-27EDDDCC0FBA}" srcOrd="0" destOrd="0" presId="urn:microsoft.com/office/officeart/2005/8/layout/hProcess4"/>
-    <dgm:cxn modelId="{79F0CE69-C2AA-4BD5-B647-985740D209A8}" type="presOf" srcId="{0A2CF205-6D73-43A4-BB70-BD446720586C}" destId="{E180D5F5-D7AB-460A-AFC2-C22437E40728}" srcOrd="1" destOrd="0" presId="urn:microsoft.com/office/officeart/2005/8/layout/hProcess4"/>
     <dgm:cxn modelId="{A4A1076E-793E-425F-8090-10E69B315A0D}" srcId="{D9BD354B-FC53-4B66-938E-867353189C31}" destId="{00998F9B-8E30-403B-9364-BEF5F913E0BA}" srcOrd="0" destOrd="0" parTransId="{EE04E4CA-1F9C-4181-ABB5-9EC632DCCD65}" sibTransId="{68E0CDCA-E961-4CE3-ACE4-C45A9A12EF82}"/>
-    <dgm:cxn modelId="{629EE957-FA94-4744-95C7-34881014FB20}" type="presOf" srcId="{1D45AC10-2207-4580-9C20-5190C50E6952}" destId="{FD569E05-4884-4284-9D47-18C9761413A9}" srcOrd="1" destOrd="0" presId="urn:microsoft.com/office/officeart/2005/8/layout/hProcess4"/>
-    <dgm:cxn modelId="{A9D97383-4AEC-4EC2-8904-DDFAE561D23E}" type="presOf" srcId="{2067B8ED-E470-4308-86F3-B1B1E2F00CC5}" destId="{8374D416-8259-404A-A853-FE5C4D036E80}" srcOrd="0" destOrd="1" presId="urn:microsoft.com/office/officeart/2005/8/layout/hProcess4"/>
     <dgm:cxn modelId="{1140DF87-CCFD-464B-BC8B-FA79448A5B59}" srcId="{D9BD354B-FC53-4B66-938E-867353189C31}" destId="{2ECA8FF7-8452-4993-BE95-C5BF94416935}" srcOrd="1" destOrd="0" parTransId="{4FEF76B2-7D3B-404C-931C-43572BDBB423}" sibTransId="{A5F1C0E4-4FCB-46A8-B9EF-07C5C3EF6B17}"/>
     <dgm:cxn modelId="{D6EE3C93-2250-42CA-867E-FB22EFFE9BE9}" type="presOf" srcId="{D9BD354B-FC53-4B66-938E-867353189C31}" destId="{565F9BFE-BDB9-432B-98E6-89E646918D46}" srcOrd="0" destOrd="0" presId="urn:microsoft.com/office/officeart/2005/8/layout/hProcess4"/>
     <dgm:cxn modelId="{184DEF96-F03D-45EE-95A8-DF96B037AB5E}" srcId="{D9BD354B-FC53-4B66-938E-867353189C31}" destId="{C3D21EA0-5807-4CC5-A3AE-69B93C472168}" srcOrd="2" destOrd="0" parTransId="{B163F721-122F-4778-B1B7-45F049AC25F3}" sibTransId="{6F64BBBA-B11B-4EA8-9E31-AD5D82603BDE}"/>
-    <dgm:cxn modelId="{0BEEC3A4-97FA-4A0D-8C99-525100BFF2DD}" srcId="{C3D21EA0-5807-4CC5-A3AE-69B93C472168}" destId="{1D45AC10-2207-4580-9C20-5190C50E6952}" srcOrd="0" destOrd="0" parTransId="{116EE3DA-AB78-49ED-8FF3-BA46E73DCE4E}" sibTransId="{B1ACBACC-6D14-4419-BE02-B4E21E934C1E}"/>
-    <dgm:cxn modelId="{F665CEA9-D86F-4E75-8ACF-EC4D591C2A9A}" type="presOf" srcId="{B39E2D75-7925-4E9B-AE76-DF7335447629}" destId="{E180D5F5-D7AB-460A-AFC2-C22437E40728}" srcOrd="1" destOrd="1" presId="urn:microsoft.com/office/officeart/2005/8/layout/hProcess4"/>
     <dgm:cxn modelId="{CF3DD9AF-E332-4001-BF48-8E22D63647C5}" type="presOf" srcId="{68E0CDCA-E961-4CE3-ACE4-C45A9A12EF82}" destId="{8919B9D8-C7D7-471D-A3AF-D4CDD534FC75}" srcOrd="0" destOrd="0" presId="urn:microsoft.com/office/officeart/2005/8/layout/hProcess4"/>
     <dgm:cxn modelId="{585279B0-ECB1-4119-8034-DB1050A0F52B}" type="presOf" srcId="{C3D21EA0-5807-4CC5-A3AE-69B93C472168}" destId="{A0FBE8DC-93D6-4FD9-B165-B742A8565BB8}" srcOrd="0" destOrd="0" presId="urn:microsoft.com/office/officeart/2005/8/layout/hProcess4"/>
-    <dgm:cxn modelId="{3CA91AC6-BD92-4983-805D-F65B3F68CA3C}" srcId="{C3D21EA0-5807-4CC5-A3AE-69B93C472168}" destId="{2067B8ED-E470-4308-86F3-B1B1E2F00CC5}" srcOrd="1" destOrd="0" parTransId="{6FF42023-FEF6-40C1-BD69-AC52ED36F8C5}" sibTransId="{A7EFC671-1A31-47D4-A23F-63A07D62746E}"/>
-    <dgm:cxn modelId="{617719D5-F302-46B2-96D1-1D768AFE1ED6}" type="presOf" srcId="{D4AE0BEF-8D8D-4274-ACD8-9357F25363F9}" destId="{32D10677-46E0-4588-B7E3-AB885E7226F9}" srcOrd="1" destOrd="1" presId="urn:microsoft.com/office/officeart/2005/8/layout/hProcess4"/>
     <dgm:cxn modelId="{A60A1AEC-C7D5-4148-8C28-8204EA9E5ACE}" type="presOf" srcId="{00998F9B-8E30-403B-9364-BEF5F913E0BA}" destId="{3F3E37A3-1B2E-4526-BC81-09E5FB3FD974}" srcOrd="0" destOrd="0" presId="urn:microsoft.com/office/officeart/2005/8/layout/hProcess4"/>
-    <dgm:cxn modelId="{F581F3F4-246C-4DA9-A8C6-770777194B92}" type="presOf" srcId="{D4AE0BEF-8D8D-4274-ACD8-9357F25363F9}" destId="{06C436DA-0F0F-47EC-9A59-1748912EAE90}" srcOrd="0" destOrd="1" presId="urn:microsoft.com/office/officeart/2005/8/layout/hProcess4"/>
-    <dgm:cxn modelId="{C2E2F6FD-72DF-48C0-A462-E6688B9CBD1C}" srcId="{00998F9B-8E30-403B-9364-BEF5F913E0BA}" destId="{5A55F53A-1FA0-44F0-A471-6DE2B3FF40DA}" srcOrd="0" destOrd="0" parTransId="{D7E4A8CC-582A-41D2-A92D-B79CC64D9F08}" sibTransId="{AB93B531-5066-4B8C-A289-577840BBA839}"/>
     <dgm:cxn modelId="{6D9FA716-DB28-411A-B2FD-F1085CFCC451}" type="presParOf" srcId="{565F9BFE-BDB9-432B-98E6-89E646918D46}" destId="{CCCB7EB1-8186-4CEB-A46F-B91C95CE7CA0}" srcOrd="0" destOrd="0" presId="urn:microsoft.com/office/officeart/2005/8/layout/hProcess4"/>
     <dgm:cxn modelId="{22B34F31-0E75-4FBA-9DE5-7E2A4366962B}" type="presParOf" srcId="{565F9BFE-BDB9-432B-98E6-89E646918D46}" destId="{6570BDD3-F9AE-4472-B81C-AC34106128FC}" srcOrd="1" destOrd="0" presId="urn:microsoft.com/office/officeart/2005/8/layout/hProcess4"/>
     <dgm:cxn modelId="{94663250-CDA4-48D4-A535-B2D719397BB7}" type="presParOf" srcId="{565F9BFE-BDB9-432B-98E6-89E646918D46}" destId="{4A277C93-4D15-4609-939F-C7B7B49E549C}" srcOrd="2" destOrd="0" presId="urn:microsoft.com/office/officeart/2005/8/layout/hProcess4"/>
@@ -1674,9 +1380,9 @@
         <dsp:cNvSpPr/>
       </dsp:nvSpPr>
       <dsp:spPr>
-        <a:xfrm>
-          <a:off x="141" y="1774586"/>
-          <a:ext cx="2266626" cy="1869493"/>
+        <a:xfrm flipH="1">
+          <a:off x="134303" y="2705594"/>
+          <a:ext cx="1648970" cy="758677"/>
         </a:xfrm>
         <a:prstGeom prst="roundRect">
           <a:avLst>
@@ -1684,12 +1390,23 @@
           </a:avLst>
         </a:prstGeom>
         <a:solidFill>
-          <a:srgbClr val="EFE3E1">
-            <a:alpha val="89804"/>
-          </a:srgbClr>
+          <a:schemeClr val="lt1">
+            <a:alpha val="90000"/>
+            <a:hueOff val="0"/>
+            <a:satOff val="0"/>
+            <a:lumOff val="0"/>
+            <a:alphaOff val="0"/>
+          </a:schemeClr>
         </a:solidFill>
         <a:ln w="12700" cap="flat" cmpd="sng" algn="ctr">
-          <a:noFill/>
+          <a:solidFill>
+            <a:schemeClr val="accent1">
+              <a:hueOff val="0"/>
+              <a:satOff val="0"/>
+              <a:lumOff val="0"/>
+              <a:alphaOff val="0"/>
+            </a:schemeClr>
+          </a:solidFill>
           <a:prstDash val="solid"/>
           <a:miter lim="800000"/>
         </a:ln>
@@ -1707,54 +1424,6 @@
         </a:effectRef>
         <a:fontRef idx="minor"/>
       </dsp:style>
-      <dsp:txBody>
-        <a:bodyPr spcFirstLastPara="0" vert="horz" wrap="square" lIns="76200" tIns="76200" rIns="76200" bIns="76200" numCol="1" spcCol="1270" anchor="t" anchorCtr="0">
-          <a:noAutofit/>
-        </a:bodyPr>
-        <a:lstStyle/>
-        <a:p>
-          <a:pPr marL="285750" lvl="1" indent="-285750" algn="l" defTabSz="1778000">
-            <a:lnSpc>
-              <a:spcPct val="90000"/>
-            </a:lnSpc>
-            <a:spcBef>
-              <a:spcPct val="0"/>
-            </a:spcBef>
-            <a:spcAft>
-              <a:spcPct val="15000"/>
-            </a:spcAft>
-            <a:buChar char="•"/>
-          </a:pPr>
-          <a:endParaRPr lang="en-US" sz="4000" kern="1200" dirty="0">
-            <a:solidFill>
-              <a:srgbClr val="972A3A"/>
-            </a:solidFill>
-          </a:endParaRPr>
-        </a:p>
-        <a:p>
-          <a:pPr marL="285750" lvl="1" indent="-285750" algn="l" defTabSz="1778000">
-            <a:lnSpc>
-              <a:spcPct val="90000"/>
-            </a:lnSpc>
-            <a:spcBef>
-              <a:spcPct val="0"/>
-            </a:spcBef>
-            <a:spcAft>
-              <a:spcPct val="15000"/>
-            </a:spcAft>
-            <a:buChar char="•"/>
-          </a:pPr>
-          <a:endParaRPr lang="en-US" sz="4000" kern="1200" dirty="0">
-            <a:solidFill>
-              <a:srgbClr val="972A3A"/>
-            </a:solidFill>
-          </a:endParaRPr>
-        </a:p>
-      </dsp:txBody>
-      <dsp:txXfrm>
-        <a:off x="43163" y="1817608"/>
-        <a:ext cx="2180582" cy="1382843"/>
-      </dsp:txXfrm>
     </dsp:sp>
     <dsp:sp modelId="{8919B9D8-C7D7-471D-A3AF-D4CDD534FC75}">
       <dsp:nvSpPr>
@@ -1763,16 +1432,16 @@
       </dsp:nvSpPr>
       <dsp:spPr>
         <a:xfrm>
-          <a:off x="1300946" y="2316885"/>
-          <a:ext cx="2356306" cy="2356306"/>
+          <a:off x="1135925" y="2060966"/>
+          <a:ext cx="2405805" cy="2405805"/>
         </a:xfrm>
         <a:prstGeom prst="leftCircularArrow">
           <a:avLst>
-            <a:gd name="adj1" fmla="val 2550"/>
-            <a:gd name="adj2" fmla="val 309429"/>
-            <a:gd name="adj3" fmla="val 2084940"/>
-            <a:gd name="adj4" fmla="val 9024489"/>
-            <a:gd name="adj5" fmla="val 2975"/>
+            <a:gd name="adj1" fmla="val 2498"/>
+            <a:gd name="adj2" fmla="val 302694"/>
+            <a:gd name="adj3" fmla="val 1253683"/>
+            <a:gd name="adj4" fmla="val 8199967"/>
+            <a:gd name="adj5" fmla="val 2914"/>
           </a:avLst>
         </a:prstGeom>
         <a:solidFill>
@@ -1884,9 +1553,9 @@
         <dsp:cNvSpPr/>
       </dsp:nvSpPr>
       <dsp:spPr>
-        <a:xfrm>
-          <a:off x="2804762" y="1774586"/>
-          <a:ext cx="2266626" cy="1869493"/>
+        <a:xfrm flipV="1">
+          <a:off x="3055372" y="1903011"/>
+          <a:ext cx="1738208" cy="689375"/>
         </a:xfrm>
         <a:prstGeom prst="roundRect">
           <a:avLst>
@@ -1894,12 +1563,23 @@
           </a:avLst>
         </a:prstGeom>
         <a:solidFill>
-          <a:srgbClr val="EFE3E1">
+          <a:schemeClr val="lt1">
             <a:alpha val="90000"/>
-          </a:srgbClr>
+            <a:hueOff val="0"/>
+            <a:satOff val="0"/>
+            <a:lumOff val="0"/>
+            <a:alphaOff val="0"/>
+          </a:schemeClr>
         </a:solidFill>
         <a:ln w="12700" cap="flat" cmpd="sng" algn="ctr">
-          <a:noFill/>
+          <a:solidFill>
+            <a:schemeClr val="accent1">
+              <a:hueOff val="0"/>
+              <a:satOff val="0"/>
+              <a:lumOff val="0"/>
+              <a:alphaOff val="0"/>
+            </a:schemeClr>
+          </a:solidFill>
           <a:prstDash val="solid"/>
           <a:miter lim="800000"/>
         </a:ln>
@@ -1917,54 +1597,6 @@
         </a:effectRef>
         <a:fontRef idx="minor"/>
       </dsp:style>
-      <dsp:txBody>
-        <a:bodyPr spcFirstLastPara="0" vert="horz" wrap="square" lIns="76200" tIns="76200" rIns="76200" bIns="76200" numCol="1" spcCol="1270" anchor="t" anchorCtr="0">
-          <a:noAutofit/>
-        </a:bodyPr>
-        <a:lstStyle/>
-        <a:p>
-          <a:pPr marL="285750" lvl="1" indent="-285750" algn="l" defTabSz="1778000">
-            <a:lnSpc>
-              <a:spcPct val="90000"/>
-            </a:lnSpc>
-            <a:spcBef>
-              <a:spcPct val="0"/>
-            </a:spcBef>
-            <a:spcAft>
-              <a:spcPct val="15000"/>
-            </a:spcAft>
-            <a:buChar char="•"/>
-          </a:pPr>
-          <a:endParaRPr lang="en-US" sz="4000" kern="1200" dirty="0">
-            <a:solidFill>
-              <a:srgbClr val="972A3A"/>
-            </a:solidFill>
-          </a:endParaRPr>
-        </a:p>
-        <a:p>
-          <a:pPr marL="285750" lvl="1" indent="-285750" algn="l" defTabSz="1778000">
-            <a:lnSpc>
-              <a:spcPct val="90000"/>
-            </a:lnSpc>
-            <a:spcBef>
-              <a:spcPct val="0"/>
-            </a:spcBef>
-            <a:spcAft>
-              <a:spcPct val="15000"/>
-            </a:spcAft>
-            <a:buChar char="•"/>
-          </a:pPr>
-          <a:endParaRPr lang="en-US" sz="4000" kern="1200" dirty="0">
-            <a:solidFill>
-              <a:srgbClr val="972A3A"/>
-            </a:solidFill>
-          </a:endParaRPr>
-        </a:p>
-      </dsp:txBody>
-      <dsp:txXfrm>
-        <a:off x="2847784" y="2218214"/>
-        <a:ext cx="2180582" cy="1382843"/>
-      </dsp:txXfrm>
     </dsp:sp>
     <dsp:sp modelId="{CC69C9B7-E8B5-468B-8A4F-27EDDDCC0FBA}">
       <dsp:nvSpPr>
@@ -1973,16 +1605,16 @@
       </dsp:nvSpPr>
       <dsp:spPr>
         <a:xfrm>
-          <a:off x="4086679" y="672173"/>
-          <a:ext cx="2645930" cy="2645930"/>
+          <a:off x="3967813" y="875843"/>
+          <a:ext cx="2552186" cy="2552186"/>
         </a:xfrm>
         <a:prstGeom prst="circularArrow">
           <a:avLst>
-            <a:gd name="adj1" fmla="val 2271"/>
-            <a:gd name="adj2" fmla="val 273786"/>
-            <a:gd name="adj3" fmla="val 19550703"/>
-            <a:gd name="adj4" fmla="val 12575511"/>
-            <a:gd name="adj5" fmla="val 2650"/>
+            <a:gd name="adj1" fmla="val 2354"/>
+            <a:gd name="adj2" fmla="val 284389"/>
+            <a:gd name="adj3" fmla="val 20162897"/>
+            <a:gd name="adj4" fmla="val 13198307"/>
+            <a:gd name="adj5" fmla="val 2747"/>
           </a:avLst>
         </a:prstGeom>
         <a:solidFill>
@@ -2095,8 +1727,8 @@
       </dsp:nvSpPr>
       <dsp:spPr>
         <a:xfrm>
-          <a:off x="5609383" y="1774586"/>
-          <a:ext cx="2266626" cy="1869493"/>
+          <a:off x="5730535" y="2643695"/>
+          <a:ext cx="1792357" cy="876007"/>
         </a:xfrm>
         <a:prstGeom prst="roundRect">
           <a:avLst>
@@ -2104,12 +1736,23 @@
           </a:avLst>
         </a:prstGeom>
         <a:solidFill>
-          <a:srgbClr val="EFE3E1">
+          <a:schemeClr val="lt1">
             <a:alpha val="90000"/>
-          </a:srgbClr>
+            <a:hueOff val="0"/>
+            <a:satOff val="0"/>
+            <a:lumOff val="0"/>
+            <a:alphaOff val="0"/>
+          </a:schemeClr>
         </a:solidFill>
         <a:ln w="12700" cap="flat" cmpd="sng" algn="ctr">
-          <a:noFill/>
+          <a:solidFill>
+            <a:schemeClr val="accent1">
+              <a:hueOff val="0"/>
+              <a:satOff val="0"/>
+              <a:lumOff val="0"/>
+              <a:alphaOff val="0"/>
+            </a:schemeClr>
+          </a:solidFill>
           <a:prstDash val="solid"/>
           <a:miter lim="800000"/>
         </a:ln>
@@ -2127,54 +1770,6 @@
         </a:effectRef>
         <a:fontRef idx="minor"/>
       </dsp:style>
-      <dsp:txBody>
-        <a:bodyPr spcFirstLastPara="0" vert="horz" wrap="square" lIns="76200" tIns="76200" rIns="76200" bIns="76200" numCol="1" spcCol="1270" anchor="t" anchorCtr="0">
-          <a:noAutofit/>
-        </a:bodyPr>
-        <a:lstStyle/>
-        <a:p>
-          <a:pPr marL="285750" lvl="1" indent="-285750" algn="l" defTabSz="1778000">
-            <a:lnSpc>
-              <a:spcPct val="90000"/>
-            </a:lnSpc>
-            <a:spcBef>
-              <a:spcPct val="0"/>
-            </a:spcBef>
-            <a:spcAft>
-              <a:spcPct val="15000"/>
-            </a:spcAft>
-            <a:buChar char="•"/>
-          </a:pPr>
-          <a:endParaRPr lang="en-US" sz="4000" kern="1200" dirty="0">
-            <a:solidFill>
-              <a:srgbClr val="972A3A"/>
-            </a:solidFill>
-          </a:endParaRPr>
-        </a:p>
-        <a:p>
-          <a:pPr marL="285750" lvl="1" indent="-285750" algn="l" defTabSz="1778000">
-            <a:lnSpc>
-              <a:spcPct val="90000"/>
-            </a:lnSpc>
-            <a:spcBef>
-              <a:spcPct val="0"/>
-            </a:spcBef>
-            <a:spcAft>
-              <a:spcPct val="15000"/>
-            </a:spcAft>
-            <a:buChar char="•"/>
-          </a:pPr>
-          <a:endParaRPr lang="en-US" sz="4000" kern="1200" dirty="0">
-            <a:solidFill>
-              <a:srgbClr val="972A3A"/>
-            </a:solidFill>
-          </a:endParaRPr>
-        </a:p>
-      </dsp:txBody>
-      <dsp:txXfrm>
-        <a:off x="5652405" y="1817608"/>
-        <a:ext cx="2180582" cy="1382843"/>
-      </dsp:txXfrm>
     </dsp:sp>
     <dsp:sp modelId="{A0FBE8DC-93D6-4FD9-B165-B742A8565BB8}">
       <dsp:nvSpPr>
@@ -3994,7 +3589,7 @@
             <a:fld id="{11A6662E-FAF4-44BC-88B5-85A7CBFB6D30}" type="datetime1">
               <a:rPr lang="en-US" smtClean="0"/>
               <a:pPr/>
-              <a:t>2/4/2022</a:t>
+              <a:t>2/14/2022</a:t>
             </a:fld>
             <a:endParaRPr lang="en-US"/>
           </a:p>
@@ -4205,7 +3800,7 @@
           <a:p>
             <a:fld id="{4C559632-1575-4E14-B53B-3DC3D5ED3947}" type="datetime1">
               <a:rPr lang="en-US" smtClean="0"/>
-              <a:t>2/4/2022</a:t>
+              <a:t>2/14/2022</a:t>
             </a:fld>
             <a:endParaRPr lang="en-US"/>
           </a:p>
@@ -4413,7 +4008,7 @@
           <a:p>
             <a:fld id="{CC4A6868-2568-4CC9-B302-F37117B01A6E}" type="datetime1">
               <a:rPr lang="en-US" smtClean="0"/>
-              <a:t>2/4/2022</a:t>
+              <a:t>2/14/2022</a:t>
             </a:fld>
             <a:endParaRPr lang="en-US"/>
           </a:p>
@@ -4616,7 +4211,7 @@
           <a:p>
             <a:fld id="{0055F08A-1E71-4B2B-BB49-E743F2903911}" type="datetime1">
               <a:rPr lang="en-US" smtClean="0"/>
-              <a:t>2/4/2022</a:t>
+              <a:t>2/14/2022</a:t>
             </a:fld>
             <a:endParaRPr lang="en-US" dirty="0"/>
           </a:p>
@@ -4890,7 +4485,7 @@
           <a:p>
             <a:fld id="{15417D9E-721A-44BB-8863-9873FE64DA75}" type="datetime1">
               <a:rPr lang="en-US" smtClean="0"/>
-              <a:t>2/4/2022</a:t>
+              <a:t>2/14/2022</a:t>
             </a:fld>
             <a:endParaRPr lang="en-US"/>
           </a:p>
@@ -5160,7 +4755,7 @@
           <a:p>
             <a:fld id="{5F31DA2F-80B8-49CF-99FB-5ABCA53A607A}" type="datetime1">
               <a:rPr lang="en-US" smtClean="0"/>
-              <a:t>2/4/2022</a:t>
+              <a:t>2/14/2022</a:t>
             </a:fld>
             <a:endParaRPr lang="en-US"/>
           </a:p>
@@ -5573,7 +5168,7 @@
           <a:p>
             <a:fld id="{28852172-E6C9-4B6C-929A-A9DE3837BBF1}" type="datetime1">
               <a:rPr lang="en-US" smtClean="0"/>
-              <a:t>2/4/2022</a:t>
+              <a:t>2/14/2022</a:t>
             </a:fld>
             <a:endParaRPr lang="en-US"/>
           </a:p>
@@ -5719,7 +5314,7 @@
           <a:p>
             <a:fld id="{3AB41CFF-90C9-47B3-9DA1-F2BF8D839F7E}" type="datetime1">
               <a:rPr lang="en-US" smtClean="0"/>
-              <a:t>2/4/2022</a:t>
+              <a:t>2/14/2022</a:t>
             </a:fld>
             <a:endParaRPr lang="en-US"/>
           </a:p>
@@ -5832,7 +5427,7 @@
           <a:p>
             <a:fld id="{F06048FA-06AB-4884-A69B-986B96E68A24}" type="datetime1">
               <a:rPr lang="en-US" smtClean="0"/>
-              <a:t>2/4/2022</a:t>
+              <a:t>2/14/2022</a:t>
             </a:fld>
             <a:endParaRPr lang="en-US"/>
           </a:p>
@@ -6143,7 +5738,7 @@
           <a:p>
             <a:fld id="{50DB7ABA-0172-4F9C-889D-567164F66BCD}" type="datetime1">
               <a:rPr lang="en-US" smtClean="0"/>
-              <a:t>2/4/2022</a:t>
+              <a:t>2/14/2022</a:t>
             </a:fld>
             <a:endParaRPr lang="en-US"/>
           </a:p>
@@ -6434,7 +6029,7 @@
           <a:p>
             <a:fld id="{78AC6A5B-8AE7-4A41-B5A7-9ADC6686DC18}" type="datetime1">
               <a:rPr lang="en-US" smtClean="0"/>
-              <a:t>2/4/2022</a:t>
+              <a:t>2/14/2022</a:t>
             </a:fld>
             <a:endParaRPr lang="en-US"/>
           </a:p>
@@ -6780,7 +6375,7 @@
             <a:fld id="{57E0CF6C-748E-4B7A-BC8B-3011EF78ED13}" type="datetime1">
               <a:rPr lang="en-US" smtClean="0"/>
               <a:pPr/>
-              <a:t>2/4/2022</a:t>
+              <a:t>2/14/2022</a:t>
             </a:fld>
             <a:endParaRPr lang="en-US" dirty="0"/>
           </a:p>
@@ -10112,7 +9707,7 @@
           <p:nvPr>
             <p:extLst>
               <p:ext uri="{D42A27DB-BD31-4B8C-83A1-F6EECF244321}">
-                <p14:modId xmlns:p14="http://schemas.microsoft.com/office/powerpoint/2010/main" val="42063775"/>
+                <p14:modId xmlns:p14="http://schemas.microsoft.com/office/powerpoint/2010/main" val="1715290387"/>
               </p:ext>
             </p:extLst>
           </p:nvPr>
@@ -11011,6 +10606,47 @@
           <a:prstGeom prst="rect">
             <a:avLst/>
           </a:prstGeom>
+        </p:spPr>
+      </p:pic>
+      <p:pic>
+        <p:nvPicPr>
+          <p:cNvPr id="11" name="Picture 10">
+            <a:extLst>
+              <a:ext uri="{FF2B5EF4-FFF2-40B4-BE49-F238E27FC236}">
+                <a16:creationId xmlns:a16="http://schemas.microsoft.com/office/drawing/2014/main" id="{40C4E534-59D2-477B-8A71-48DC1807467D}"/>
+              </a:ext>
+            </a:extLst>
+          </p:cNvPr>
+          <p:cNvPicPr>
+            <a:picLocks noChangeAspect="1"/>
+          </p:cNvPicPr>
+          <p:nvPr/>
+        </p:nvPicPr>
+        <p:blipFill>
+          <a:blip r:embed="rId9">
+            <a:extLst>
+              <a:ext uri="{28A0092B-C50C-407E-A947-70E740481C1C}">
+                <a14:useLocalDpi xmlns:a14="http://schemas.microsoft.com/office/drawing/2010/main" val="0"/>
+              </a:ext>
+            </a:extLst>
+          </a:blip>
+          <a:srcRect/>
+          <a:stretch>
+            <a:fillRect/>
+          </a:stretch>
+        </p:blipFill>
+        <p:spPr bwMode="auto">
+          <a:xfrm>
+            <a:off x="6809444" y="0"/>
+            <a:ext cx="5401433" cy="6858000"/>
+          </a:xfrm>
+          <a:prstGeom prst="rect">
+            <a:avLst/>
+          </a:prstGeom>
+          <a:noFill/>
+          <a:ln>
+            <a:noFill/>
+          </a:ln>
         </p:spPr>
       </p:pic>
     </p:spTree>

</xml_diff>